<commit_message>
performed sentiment analysis - unsuccessful
</commit_message>
<xml_diff>
--- a/Presentation Template - Task 1.pptx
+++ b/Presentation Template - Task 1.pptx
@@ -262,7 +262,7 @@
           <a:p>
             <a:fld id="{6670FE10-F406-47AF-8AE1-E9BA4C7E25F2}" type="datetimeFigureOut">
               <a:rPr lang="en-GB" smtClean="0"/>
-              <a:t>06/12/2022</a:t>
+              <a:t>10/04/2023</a:t>
             </a:fld>
             <a:endParaRPr lang="en-GB" dirty="0"/>
           </a:p>
@@ -596,7 +596,7 @@
           <a:p>
             <a:fld id="{6670FE10-F406-47AF-8AE1-E9BA4C7E25F2}" type="datetimeFigureOut">
               <a:rPr lang="en-GB" smtClean="0"/>
-              <a:t>06/12/2022</a:t>
+              <a:t>10/04/2023</a:t>
             </a:fld>
             <a:endParaRPr lang="en-GB"/>
           </a:p>
@@ -806,7 +806,7 @@
           <a:p>
             <a:fld id="{6670FE10-F406-47AF-8AE1-E9BA4C7E25F2}" type="datetimeFigureOut">
               <a:rPr lang="en-GB" smtClean="0"/>
-              <a:t>06/12/2022</a:t>
+              <a:t>10/04/2023</a:t>
             </a:fld>
             <a:endParaRPr lang="en-GB"/>
           </a:p>
@@ -1006,7 +1006,7 @@
           <a:p>
             <a:fld id="{6670FE10-F406-47AF-8AE1-E9BA4C7E25F2}" type="datetimeFigureOut">
               <a:rPr lang="en-GB" smtClean="0"/>
-              <a:t>06/12/2022</a:t>
+              <a:t>10/04/2023</a:t>
             </a:fld>
             <a:endParaRPr lang="en-GB"/>
           </a:p>
@@ -1413,7 +1413,7 @@
           <a:p>
             <a:fld id="{6670FE10-F406-47AF-8AE1-E9BA4C7E25F2}" type="datetimeFigureOut">
               <a:rPr lang="en-GB" smtClean="0"/>
-              <a:t>06/12/2022</a:t>
+              <a:t>10/04/2023</a:t>
             </a:fld>
             <a:endParaRPr lang="en-GB"/>
           </a:p>
@@ -1681,7 +1681,7 @@
           <a:p>
             <a:fld id="{6670FE10-F406-47AF-8AE1-E9BA4C7E25F2}" type="datetimeFigureOut">
               <a:rPr lang="en-GB" smtClean="0"/>
-              <a:t>06/12/2022</a:t>
+              <a:t>10/04/2023</a:t>
             </a:fld>
             <a:endParaRPr lang="en-GB"/>
           </a:p>
@@ -2096,7 +2096,7 @@
           <a:p>
             <a:fld id="{6670FE10-F406-47AF-8AE1-E9BA4C7E25F2}" type="datetimeFigureOut">
               <a:rPr lang="en-GB" smtClean="0"/>
-              <a:t>06/12/2022</a:t>
+              <a:t>10/04/2023</a:t>
             </a:fld>
             <a:endParaRPr lang="en-GB"/>
           </a:p>
@@ -2238,7 +2238,7 @@
           <a:p>
             <a:fld id="{6670FE10-F406-47AF-8AE1-E9BA4C7E25F2}" type="datetimeFigureOut">
               <a:rPr lang="en-GB" smtClean="0"/>
-              <a:t>06/12/2022</a:t>
+              <a:t>10/04/2023</a:t>
             </a:fld>
             <a:endParaRPr lang="en-GB"/>
           </a:p>
@@ -2351,7 +2351,7 @@
           <a:p>
             <a:fld id="{6670FE10-F406-47AF-8AE1-E9BA4C7E25F2}" type="datetimeFigureOut">
               <a:rPr lang="en-GB" smtClean="0"/>
-              <a:t>06/12/2022</a:t>
+              <a:t>10/04/2023</a:t>
             </a:fld>
             <a:endParaRPr lang="en-GB"/>
           </a:p>
@@ -2664,7 +2664,7 @@
           <a:p>
             <a:fld id="{6670FE10-F406-47AF-8AE1-E9BA4C7E25F2}" type="datetimeFigureOut">
               <a:rPr lang="en-GB" smtClean="0"/>
-              <a:t>06/12/2022</a:t>
+              <a:t>10/04/2023</a:t>
             </a:fld>
             <a:endParaRPr lang="en-GB"/>
           </a:p>
@@ -2953,7 +2953,7 @@
           <a:p>
             <a:fld id="{6670FE10-F406-47AF-8AE1-E9BA4C7E25F2}" type="datetimeFigureOut">
               <a:rPr lang="en-GB" smtClean="0"/>
-              <a:t>06/12/2022</a:t>
+              <a:t>10/04/2023</a:t>
             </a:fld>
             <a:endParaRPr lang="en-GB"/>
           </a:p>
@@ -3196,7 +3196,7 @@
           <a:p>
             <a:fld id="{6670FE10-F406-47AF-8AE1-E9BA4C7E25F2}" type="datetimeFigureOut">
               <a:rPr lang="en-GB" smtClean="0"/>
-              <a:t>06/12/2022</a:t>
+              <a:t>10/04/2023</a:t>
             </a:fld>
             <a:endParaRPr lang="en-GB"/>
           </a:p>
@@ -3636,7 +3636,7 @@
           <a:p>
             <a:r>
               <a:rPr lang="en-GB" dirty="0"/>
-              <a:t>TITLE</a:t>
+              <a:t>Customer review sentiment analysis report</a:t>
             </a:r>
           </a:p>
         </p:txBody>
@@ -3662,7 +3662,10 @@
           <a:bodyPr/>
           <a:lstStyle/>
           <a:p>
-            <a:endParaRPr lang="en-GB" dirty="0"/>
+            <a:r>
+              <a:rPr lang="en-GB" dirty="0"/>
+              <a:t>Insights obtained from the customer review data for British airlines</a:t>
+            </a:r>
           </a:p>
         </p:txBody>
       </p:sp>
@@ -3717,35 +3720,48 @@
           <a:bodyPr/>
           <a:lstStyle/>
           <a:p>
-            <a:endParaRPr lang="en-GB"/>
-          </a:p>
-        </p:txBody>
-      </p:sp>
-      <p:sp>
-        <p:nvSpPr>
-          <p:cNvPr id="3" name="Content Placeholder 2">
-            <a:extLst>
-              <a:ext uri="{FF2B5EF4-FFF2-40B4-BE49-F238E27FC236}">
-                <a16:creationId xmlns:a16="http://schemas.microsoft.com/office/drawing/2014/main" id="{4B7DE7AA-9B0B-5A8C-C9D3-A89360AA97ED}"/>
-              </a:ext>
-            </a:extLst>
-          </p:cNvPr>
-          <p:cNvSpPr>
-            <a:spLocks noGrp="1"/>
-          </p:cNvSpPr>
+            <a:r>
+              <a:rPr lang="en-GB" dirty="0"/>
+              <a:t>Decline in number of Recommendation by customer per year after 2016</a:t>
+            </a:r>
+          </a:p>
+        </p:txBody>
+      </p:sp>
+      <p:pic>
+        <p:nvPicPr>
+          <p:cNvPr id="5" name="Content Placeholder 4">
+            <a:extLst>
+              <a:ext uri="{FF2B5EF4-FFF2-40B4-BE49-F238E27FC236}">
+                <a16:creationId xmlns:a16="http://schemas.microsoft.com/office/drawing/2014/main" id="{B61541D9-8D04-14E7-C0A9-20D775C6D503}"/>
+              </a:ext>
+            </a:extLst>
+          </p:cNvPr>
+          <p:cNvPicPr>
+            <a:picLocks noGrp="1" noChangeAspect="1"/>
+          </p:cNvPicPr>
           <p:nvPr>
             <p:ph idx="1"/>
           </p:nvPr>
-        </p:nvSpPr>
-        <p:spPr/>
-        <p:txBody>
-          <a:bodyPr/>
-          <a:lstStyle/>
-          <a:p>
-            <a:endParaRPr lang="en-GB"/>
-          </a:p>
-        </p:txBody>
-      </p:sp>
+        </p:nvPicPr>
+        <p:blipFill>
+          <a:blip r:embed="rId2">
+            <a:extLst>
+              <a:ext uri="{28A0092B-C50C-407E-A947-70E740481C1C}">
+                <a14:useLocalDpi xmlns:a14="http://schemas.microsoft.com/office/drawing/2010/main" val="0"/>
+              </a:ext>
+            </a:extLst>
+          </a:blip>
+          <a:stretch>
+            <a:fillRect/>
+          </a:stretch>
+        </p:blipFill>
+        <p:spPr>
+          <a:xfrm>
+            <a:off x="3486112" y="1825625"/>
+            <a:ext cx="5219776" cy="4351338"/>
+          </a:xfrm>
+        </p:spPr>
+      </p:pic>
     </p:spTree>
     <p:extLst>
       <p:ext uri="{BB962C8B-B14F-4D97-AF65-F5344CB8AC3E}">

</xml_diff>